<commit_message>
update the gitignore to not upload the pth and npy files
</commit_message>
<xml_diff>
--- a/presentation/4th_presentation/GreenAI_4th.pptx
+++ b/presentation/4th_presentation/GreenAI_4th.pptx
@@ -6,10 +6,10 @@
     <p:sldMasterId id="2147483672" r:id="rId2"/>
   </p:sldMasterIdLst>
   <p:notesMasterIdLst>
-    <p:notesMasterId r:id="rId9"/>
+    <p:notesMasterId r:id="rId10"/>
   </p:notesMasterIdLst>
   <p:handoutMasterIdLst>
-    <p:handoutMasterId r:id="rId10"/>
+    <p:handoutMasterId r:id="rId11"/>
   </p:handoutMasterIdLst>
   <p:sldIdLst>
     <p:sldId id="256" r:id="rId3"/>
@@ -17,7 +17,8 @@
     <p:sldId id="317" r:id="rId5"/>
     <p:sldId id="380" r:id="rId6"/>
     <p:sldId id="376" r:id="rId7"/>
-    <p:sldId id="261" r:id="rId8"/>
+    <p:sldId id="382" r:id="rId8"/>
+    <p:sldId id="261" r:id="rId9"/>
   </p:sldIdLst>
   <p:sldSz cx="12192000" cy="6858000"/>
   <p:notesSz cx="6858000" cy="9144000"/>
@@ -11321,6 +11322,97 @@
     <p:extLst>
       <p:ext uri="{BB962C8B-B14F-4D97-AF65-F5344CB8AC3E}">
         <p14:creationId xmlns:p14="http://schemas.microsoft.com/office/powerpoint/2010/main" val="1885556332"/>
+      </p:ext>
+    </p:extLst>
+  </p:cSld>
+  <p:clrMapOvr>
+    <a:masterClrMapping/>
+  </p:clrMapOvr>
+</p:notes>
+</file>
+
+<file path=ppt/notesSlides/notesSlide6.xml><?xml version="1.0" encoding="utf-8"?>
+<p:notes xmlns:a="http://schemas.openxmlformats.org/drawingml/2006/main" xmlns:r="http://schemas.openxmlformats.org/officeDocument/2006/relationships" xmlns:p="http://schemas.openxmlformats.org/presentationml/2006/main">
+  <p:cSld>
+    <p:spTree>
+      <p:nvGrpSpPr>
+        <p:cNvPr id="1" name=""/>
+        <p:cNvGrpSpPr/>
+        <p:nvPr/>
+      </p:nvGrpSpPr>
+      <p:grpSpPr>
+        <a:xfrm>
+          <a:off x="0" y="0"/>
+          <a:ext cx="0" cy="0"/>
+          <a:chOff x="0" y="0"/>
+          <a:chExt cx="0" cy="0"/>
+        </a:xfrm>
+      </p:grpSpPr>
+      <p:sp>
+        <p:nvSpPr>
+          <p:cNvPr id="2" name="幻灯片图像占位符 1"/>
+          <p:cNvSpPr>
+            <a:spLocks noGrp="1" noRot="1" noChangeAspect="1"/>
+          </p:cNvSpPr>
+          <p:nvPr>
+            <p:ph type="sldImg"/>
+          </p:nvPr>
+        </p:nvSpPr>
+        <p:spPr/>
+      </p:sp>
+      <p:sp>
+        <p:nvSpPr>
+          <p:cNvPr id="3" name="备注占位符 2"/>
+          <p:cNvSpPr>
+            <a:spLocks noGrp="1"/>
+          </p:cNvSpPr>
+          <p:nvPr>
+            <p:ph type="body" idx="1"/>
+          </p:nvPr>
+        </p:nvSpPr>
+        <p:spPr/>
+        <p:txBody>
+          <a:bodyPr/>
+          <a:lstStyle/>
+          <a:p>
+            <a:pPr marL="342900" lvl="0" indent="-342900" algn="just">
+              <a:buFont typeface="宋体" panose="02010600030101010101" pitchFamily="2" charset="-122"/>
+              <a:buChar char="•"/>
+              <a:tabLst>
+                <a:tab pos="457200" algn="l"/>
+              </a:tabLst>
+            </a:pPr>
+            <a:endParaRPr kumimoji="1" lang="zh-CN" altLang="en-US" dirty="0"/>
+          </a:p>
+        </p:txBody>
+      </p:sp>
+      <p:sp>
+        <p:nvSpPr>
+          <p:cNvPr id="4" name="灯片编号占位符 3"/>
+          <p:cNvSpPr>
+            <a:spLocks noGrp="1"/>
+          </p:cNvSpPr>
+          <p:nvPr>
+            <p:ph type="sldNum" sz="quarter" idx="5"/>
+          </p:nvPr>
+        </p:nvSpPr>
+        <p:spPr/>
+        <p:txBody>
+          <a:bodyPr/>
+          <a:lstStyle/>
+          <a:p>
+            <a:fld id="{E9E6FDB6-6D2B-46C1-9FA1-D82906A37C3A}" type="slidenum">
+              <a:rPr lang="zh-CN" altLang="en-US" smtClean="0"/>
+              <a:t>6</a:t>
+            </a:fld>
+            <a:endParaRPr lang="zh-CN" altLang="en-US"/>
+          </a:p>
+        </p:txBody>
+      </p:sp>
+    </p:spTree>
+    <p:extLst>
+      <p:ext uri="{BB962C8B-B14F-4D97-AF65-F5344CB8AC3E}">
+        <p14:creationId xmlns:p14="http://schemas.microsoft.com/office/powerpoint/2010/main" val="3500297315"/>
       </p:ext>
     </p:extLst>
   </p:cSld>
@@ -18139,8 +18231,8 @@
         </p:blipFill>
         <p:spPr>
           <a:xfrm>
-            <a:off x="1502228" y="1810005"/>
-            <a:ext cx="2277836" cy="176576"/>
+            <a:off x="413167" y="1858566"/>
+            <a:ext cx="6108526" cy="473528"/>
           </a:xfrm>
           <a:prstGeom prst="rect">
             <a:avLst/>
@@ -18175,8 +18267,8 @@
         </p:blipFill>
         <p:spPr>
           <a:xfrm>
-            <a:off x="1502228" y="1986581"/>
-            <a:ext cx="3117851" cy="2235273"/>
+            <a:off x="669924" y="2721563"/>
+            <a:ext cx="5033547" cy="3608688"/>
           </a:xfrm>
           <a:prstGeom prst="rect">
             <a:avLst/>
@@ -18277,8 +18369,8 @@
         </p:blipFill>
         <p:spPr>
           <a:xfrm>
-            <a:off x="6817179" y="4221854"/>
-            <a:ext cx="3384887" cy="1860698"/>
+            <a:off x="5070765" y="4221854"/>
+            <a:ext cx="5131302" cy="2820716"/>
           </a:xfrm>
           <a:prstGeom prst="rect">
             <a:avLst/>
@@ -18343,8 +18435,8 @@
         </p:blipFill>
         <p:spPr>
           <a:xfrm>
-            <a:off x="6927111" y="1898293"/>
-            <a:ext cx="3165021" cy="1758345"/>
+            <a:off x="5909723" y="1898293"/>
+            <a:ext cx="4182410" cy="2323561"/>
           </a:xfrm>
           <a:prstGeom prst="rect">
             <a:avLst/>
@@ -18606,12 +18698,45 @@
           </a:p>
         </p:txBody>
       </p:sp>
+      <p:pic>
+        <p:nvPicPr>
+          <p:cNvPr id="3" name="Google Shape;64;p1" descr="徽标&#10;&#10;描述已自动生成">
+            <a:extLst>
+              <a:ext uri="{FF2B5EF4-FFF2-40B4-BE49-F238E27FC236}">
+                <a16:creationId xmlns:a16="http://schemas.microsoft.com/office/drawing/2014/main" id="{C5DDBA85-B6C2-5E11-4B1D-D65AE1ABDFCC}"/>
+              </a:ext>
+            </a:extLst>
+          </p:cNvPr>
+          <p:cNvPicPr preferRelativeResize="0"/>
+          <p:nvPr/>
+        </p:nvPicPr>
+        <p:blipFill rotWithShape="1">
+          <a:blip r:embed="rId3">
+            <a:alphaModFix/>
+          </a:blip>
+          <a:srcRect/>
+          <a:stretch/>
+        </p:blipFill>
+        <p:spPr>
+          <a:xfrm>
+            <a:off x="9863328" y="1"/>
+            <a:ext cx="2328672" cy="1028700"/>
+          </a:xfrm>
+          <a:prstGeom prst="rect">
+            <a:avLst/>
+          </a:prstGeom>
+          <a:noFill/>
+          <a:ln>
+            <a:noFill/>
+          </a:ln>
+        </p:spPr>
+      </p:pic>
       <p:sp>
         <p:nvSpPr>
-          <p:cNvPr id="6" name="文本框 5">
+          <p:cNvPr id="5" name="文本框 4">
             <a:extLst>
               <a:ext uri="{FF2B5EF4-FFF2-40B4-BE49-F238E27FC236}">
-                <a16:creationId xmlns:a16="http://schemas.microsoft.com/office/drawing/2014/main" id="{40A76273-2CE1-43EB-D92B-AE83662FFACA}"/>
+                <a16:creationId xmlns:a16="http://schemas.microsoft.com/office/drawing/2014/main" id="{66F5E597-F380-87AE-79B0-D2BBEC3E814B}"/>
               </a:ext>
             </a:extLst>
           </p:cNvPr>
@@ -18620,70 +18745,8 @@
         </p:nvSpPr>
         <p:spPr>
           <a:xfrm>
-            <a:off x="669924" y="1225141"/>
-            <a:ext cx="10841429" cy="646331"/>
-          </a:xfrm>
-          <a:prstGeom prst="rect">
-            <a:avLst/>
-          </a:prstGeom>
-          <a:noFill/>
-        </p:spPr>
-        <p:txBody>
-          <a:bodyPr wrap="square" rtlCol="0">
-            <a:spAutoFit/>
-          </a:bodyPr>
-          <a:lstStyle/>
-          <a:p>
-            <a:r>
-              <a:rPr kumimoji="1" lang="en-US" altLang="zh-CN" dirty="0"/>
-              <a:t>The avg GPU power of all epochs is 78.65W, the </a:t>
-            </a:r>
-            <a:r>
-              <a:rPr kumimoji="1" lang="en-US" altLang="zh-CN" dirty="0" err="1"/>
-              <a:t>codecarbon</a:t>
-            </a:r>
-            <a:r>
-              <a:rPr kumimoji="1" lang="en-US" altLang="zh-CN" dirty="0"/>
-              <a:t> result is 120.88W</a:t>
-            </a:r>
-          </a:p>
-          <a:p>
-            <a:r>
-              <a:rPr kumimoji="1" lang="en-US" altLang="zh-CN" dirty="0"/>
-              <a:t>The GPU energy consumption calculated by </a:t>
-            </a:r>
-            <a:r>
-              <a:rPr kumimoji="1" lang="en-US" altLang="zh-CN" dirty="0" err="1"/>
-              <a:t>nvidia-smi</a:t>
-            </a:r>
-            <a:r>
-              <a:rPr kumimoji="1" lang="en-US" altLang="zh-CN" dirty="0"/>
-              <a:t> is 0.03275kWh, and 0.05915kWh by </a:t>
-            </a:r>
-            <a:r>
-              <a:rPr kumimoji="1" lang="en-US" altLang="zh-CN" dirty="0" err="1"/>
-              <a:t>codecarbon</a:t>
-            </a:r>
-            <a:endParaRPr kumimoji="1" lang="zh-CN" altLang="en-US" dirty="0"/>
-          </a:p>
-        </p:txBody>
-      </p:sp>
-      <p:sp>
-        <p:nvSpPr>
-          <p:cNvPr id="9" name="文本框 8">
-            <a:extLst>
-              <a:ext uri="{FF2B5EF4-FFF2-40B4-BE49-F238E27FC236}">
-                <a16:creationId xmlns:a16="http://schemas.microsoft.com/office/drawing/2014/main" id="{0FCF66F7-CB24-B59A-11AB-F752C78DBF82}"/>
-              </a:ext>
-            </a:extLst>
-          </p:cNvPr>
-          <p:cNvSpPr txBox="1"/>
-          <p:nvPr/>
-        </p:nvSpPr>
-        <p:spPr>
-          <a:xfrm>
-            <a:off x="669924" y="2004446"/>
-            <a:ext cx="7423827" cy="646331"/>
+            <a:off x="669924" y="1467437"/>
+            <a:ext cx="2095445" cy="523220"/>
           </a:xfrm>
           <a:prstGeom prst="rect">
             <a:avLst/>
@@ -18697,97 +18760,34 @@
           <a:lstStyle/>
           <a:p>
             <a:r>
-              <a:rPr kumimoji="1" lang="en-US" altLang="zh-CN" dirty="0"/>
-              <a:t>Ratio between power result is 78.65/130 = 0.6506</a:t>
+              <a:rPr kumimoji="1" lang="en-US" altLang="zh-CN" sz="1400" dirty="0"/>
+              <a:t>Model: </a:t>
             </a:r>
+            <a:r>
+              <a:rPr kumimoji="1" lang="en-US" altLang="zh-CN" sz="1400" dirty="0" err="1"/>
+              <a:t>Alexnet</a:t>
+            </a:r>
+            <a:endParaRPr kumimoji="1" lang="en-US" altLang="zh-CN" sz="1400" dirty="0"/>
           </a:p>
           <a:p>
             <a:r>
-              <a:rPr kumimoji="1" lang="en-US" altLang="zh-CN" dirty="0"/>
-              <a:t>Ratio between energy consumption result is 0.03275/0.05915 = 0.5537</a:t>
+              <a:rPr kumimoji="1" lang="en-US" altLang="zh-CN" sz="1400" dirty="0"/>
+              <a:t>Dataset: </a:t>
             </a:r>
-            <a:endParaRPr kumimoji="1" lang="zh-CN" altLang="en-US" dirty="0"/>
+            <a:r>
+              <a:rPr kumimoji="1" lang="en-US" altLang="zh-CN" sz="1400" dirty="0" err="1"/>
+              <a:t>FashionMNIST</a:t>
+            </a:r>
+            <a:endParaRPr kumimoji="1" lang="zh-CN" altLang="en-US" sz="1400" dirty="0"/>
           </a:p>
         </p:txBody>
       </p:sp>
-      <p:pic>
-        <p:nvPicPr>
-          <p:cNvPr id="11" name="图片 10" descr="图形用户界面, 文本&#10;&#10;描述已自动生成">
+      <p:sp>
+        <p:nvSpPr>
+          <p:cNvPr id="10" name="文本框 9">
             <a:extLst>
               <a:ext uri="{FF2B5EF4-FFF2-40B4-BE49-F238E27FC236}">
-                <a16:creationId xmlns:a16="http://schemas.microsoft.com/office/drawing/2014/main" id="{52DC0C0F-33EB-D61E-B66B-95A65C0543BE}"/>
-              </a:ext>
-            </a:extLst>
-          </p:cNvPr>
-          <p:cNvPicPr>
-            <a:picLocks noChangeAspect="1"/>
-          </p:cNvPicPr>
-          <p:nvPr/>
-        </p:nvPicPr>
-        <p:blipFill>
-          <a:blip r:embed="rId3">
-            <a:extLst>
-              <a:ext uri="{28A0092B-C50C-407E-A947-70E740481C1C}">
-                <a14:useLocalDpi xmlns:a14="http://schemas.microsoft.com/office/drawing/2010/main" val="0"/>
-              </a:ext>
-            </a:extLst>
-          </a:blip>
-          <a:stretch>
-            <a:fillRect/>
-          </a:stretch>
-        </p:blipFill>
-        <p:spPr>
-          <a:xfrm>
-            <a:off x="669924" y="3812573"/>
-            <a:ext cx="4229100" cy="2070100"/>
-          </a:xfrm>
-          <a:prstGeom prst="rect">
-            <a:avLst/>
-          </a:prstGeom>
-        </p:spPr>
-      </p:pic>
-      <p:cxnSp>
-        <p:nvCxnSpPr>
-          <p:cNvPr id="13" name="直线连接符 12">
-            <a:extLst>
-              <a:ext uri="{FF2B5EF4-FFF2-40B4-BE49-F238E27FC236}">
-                <a16:creationId xmlns:a16="http://schemas.microsoft.com/office/drawing/2014/main" id="{32773B86-BE32-B421-6E02-7B124BA12490}"/>
-              </a:ext>
-            </a:extLst>
-          </p:cNvPr>
-          <p:cNvCxnSpPr/>
-          <p:nvPr/>
-        </p:nvCxnSpPr>
-        <p:spPr>
-          <a:xfrm>
-            <a:off x="669924" y="3086100"/>
-            <a:ext cx="10631489" cy="0"/>
-          </a:xfrm>
-          <a:prstGeom prst="line">
-            <a:avLst/>
-          </a:prstGeom>
-        </p:spPr>
-        <p:style>
-          <a:lnRef idx="1">
-            <a:schemeClr val="accent1"/>
-          </a:lnRef>
-          <a:fillRef idx="0">
-            <a:schemeClr val="accent1"/>
-          </a:fillRef>
-          <a:effectRef idx="0">
-            <a:schemeClr val="accent1"/>
-          </a:effectRef>
-          <a:fontRef idx="minor">
-            <a:schemeClr val="tx1"/>
-          </a:fontRef>
-        </p:style>
-      </p:cxnSp>
-      <p:sp>
-        <p:nvSpPr>
-          <p:cNvPr id="14" name="文本框 13">
-            <a:extLst>
-              <a:ext uri="{FF2B5EF4-FFF2-40B4-BE49-F238E27FC236}">
-                <a16:creationId xmlns:a16="http://schemas.microsoft.com/office/drawing/2014/main" id="{B02FD2E1-006F-DFF0-3A95-6B9D1B7424C9}"/>
+                <a16:creationId xmlns:a16="http://schemas.microsoft.com/office/drawing/2014/main" id="{FCF81B9A-A768-F358-57EA-2E8045046A84}"/>
               </a:ext>
             </a:extLst>
           </p:cNvPr>
@@ -18796,8 +18796,8 @@
         </p:nvSpPr>
         <p:spPr>
           <a:xfrm>
-            <a:off x="669924" y="3264671"/>
-            <a:ext cx="1928733" cy="369332"/>
+            <a:off x="669924" y="2022172"/>
+            <a:ext cx="4124847" cy="307777"/>
           </a:xfrm>
           <a:prstGeom prst="rect">
             <a:avLst/>
@@ -18811,19 +18811,19 @@
           <a:lstStyle/>
           <a:p>
             <a:r>
-              <a:rPr kumimoji="1" lang="en-US" altLang="zh-CN" dirty="0"/>
-              <a:t>Idle consumption</a:t>
+              <a:rPr kumimoji="1" lang="en-US" altLang="zh-CN" sz="1400" dirty="0"/>
+              <a:t>1. Simulated 5 epochs on each of the two devices</a:t>
             </a:r>
-            <a:endParaRPr kumimoji="1" lang="zh-CN" altLang="en-US" dirty="0"/>
+            <a:endParaRPr kumimoji="1" lang="zh-CN" altLang="en-US" sz="1400" dirty="0"/>
           </a:p>
         </p:txBody>
       </p:sp>
       <p:pic>
         <p:nvPicPr>
-          <p:cNvPr id="15" name="图片 14">
+          <p:cNvPr id="12" name="图片 11">
             <a:extLst>
               <a:ext uri="{FF2B5EF4-FFF2-40B4-BE49-F238E27FC236}">
-                <a16:creationId xmlns:a16="http://schemas.microsoft.com/office/drawing/2014/main" id="{DA9D3A40-3C98-9830-ABC1-2BB095A92648}"/>
+                <a16:creationId xmlns:a16="http://schemas.microsoft.com/office/drawing/2014/main" id="{BB5DAF3F-D480-5F3B-2240-643295D88645}"/>
               </a:ext>
             </a:extLst>
           </p:cNvPr>
@@ -18840,14 +18840,386 @@
         </p:blipFill>
         <p:spPr>
           <a:xfrm>
-            <a:off x="5940615" y="3812573"/>
-            <a:ext cx="3922713" cy="2324979"/>
+            <a:off x="669924" y="2329949"/>
+            <a:ext cx="2580290" cy="2038250"/>
           </a:xfrm>
           <a:prstGeom prst="rect">
             <a:avLst/>
           </a:prstGeom>
         </p:spPr>
       </p:pic>
+      <p:pic>
+        <p:nvPicPr>
+          <p:cNvPr id="16" name="图片 15">
+            <a:extLst>
+              <a:ext uri="{FF2B5EF4-FFF2-40B4-BE49-F238E27FC236}">
+                <a16:creationId xmlns:a16="http://schemas.microsoft.com/office/drawing/2014/main" id="{9A2C1B68-07E2-C456-DD7D-890DCCD1BF36}"/>
+              </a:ext>
+            </a:extLst>
+          </p:cNvPr>
+          <p:cNvPicPr>
+            <a:picLocks noChangeAspect="1"/>
+          </p:cNvPicPr>
+          <p:nvPr/>
+        </p:nvPicPr>
+        <p:blipFill>
+          <a:blip r:embed="rId5"/>
+          <a:stretch>
+            <a:fillRect/>
+          </a:stretch>
+        </p:blipFill>
+        <p:spPr>
+          <a:xfrm>
+            <a:off x="3250215" y="2329949"/>
+            <a:ext cx="2580290" cy="2070603"/>
+          </a:xfrm>
+          <a:prstGeom prst="rect">
+            <a:avLst/>
+          </a:prstGeom>
+        </p:spPr>
+      </p:pic>
+      <p:pic>
+        <p:nvPicPr>
+          <p:cNvPr id="17" name="图片 16">
+            <a:extLst>
+              <a:ext uri="{FF2B5EF4-FFF2-40B4-BE49-F238E27FC236}">
+                <a16:creationId xmlns:a16="http://schemas.microsoft.com/office/drawing/2014/main" id="{C371688C-9E4C-485E-6E7D-2765D3B943B1}"/>
+              </a:ext>
+            </a:extLst>
+          </p:cNvPr>
+          <p:cNvPicPr>
+            <a:picLocks noChangeAspect="1"/>
+          </p:cNvPicPr>
+          <p:nvPr/>
+        </p:nvPicPr>
+        <p:blipFill>
+          <a:blip r:embed="rId6"/>
+          <a:stretch>
+            <a:fillRect/>
+          </a:stretch>
+        </p:blipFill>
+        <p:spPr>
+          <a:xfrm>
+            <a:off x="5830505" y="2329950"/>
+            <a:ext cx="2643461" cy="2042062"/>
+          </a:xfrm>
+          <a:prstGeom prst="rect">
+            <a:avLst/>
+          </a:prstGeom>
+        </p:spPr>
+      </p:pic>
+      <p:graphicFrame>
+        <p:nvGraphicFramePr>
+          <p:cNvPr id="19" name="表格 18">
+            <a:extLst>
+              <a:ext uri="{FF2B5EF4-FFF2-40B4-BE49-F238E27FC236}">
+                <a16:creationId xmlns:a16="http://schemas.microsoft.com/office/drawing/2014/main" id="{319B09C0-662E-6983-9F41-E66C69D3B84D}"/>
+              </a:ext>
+            </a:extLst>
+          </p:cNvPr>
+          <p:cNvGraphicFramePr>
+            <a:graphicFrameLocks noGrp="1"/>
+          </p:cNvGraphicFramePr>
+          <p:nvPr>
+            <p:extLst>
+              <p:ext uri="{D42A27DB-BD31-4B8C-83A1-F6EECF244321}">
+                <p14:modId xmlns:p14="http://schemas.microsoft.com/office/powerpoint/2010/main" val="1362415234"/>
+              </p:ext>
+            </p:extLst>
+          </p:nvPr>
+        </p:nvGraphicFramePr>
+        <p:xfrm>
+          <a:off x="8376744" y="6028792"/>
+          <a:ext cx="3815256" cy="829207"/>
+        </p:xfrm>
+        <a:graphic>
+          <a:graphicData uri="http://schemas.openxmlformats.org/drawingml/2006/table">
+            <a:tbl>
+              <a:tblPr firstRow="1" bandRow="1">
+                <a:tableStyleId>{5C22544A-7EE6-4342-B048-85BDC9FD1C3A}</a:tableStyleId>
+              </a:tblPr>
+              <a:tblGrid>
+                <a:gridCol w="1907628">
+                  <a:extLst>
+                    <a:ext uri="{9D8B030D-6E8A-4147-A177-3AD203B41FA5}">
+                      <a16:colId xmlns:a16="http://schemas.microsoft.com/office/drawing/2014/main" val="3783558254"/>
+                    </a:ext>
+                  </a:extLst>
+                </a:gridCol>
+                <a:gridCol w="1907628">
+                  <a:extLst>
+                    <a:ext uri="{9D8B030D-6E8A-4147-A177-3AD203B41FA5}">
+                      <a16:colId xmlns:a16="http://schemas.microsoft.com/office/drawing/2014/main" val="3750936486"/>
+                    </a:ext>
+                  </a:extLst>
+                </a:gridCol>
+              </a:tblGrid>
+              <a:tr h="372007">
+                <a:tc>
+                  <a:txBody>
+                    <a:bodyPr/>
+                    <a:lstStyle/>
+                    <a:p>
+                      <a:r>
+                        <a:rPr lang="en-US" altLang="zh-CN" sz="1200" dirty="0"/>
+                        <a:t>total energy consumption(FL)</a:t>
+                      </a:r>
+                    </a:p>
+                  </a:txBody>
+                  <a:tcPr/>
+                </a:tc>
+                <a:tc>
+                  <a:txBody>
+                    <a:bodyPr/>
+                    <a:lstStyle/>
+                    <a:p>
+                      <a:pPr marL="0" marR="0" lvl="0" indent="0" algn="l" defTabSz="913765" rtl="0" eaLnBrk="1" fontAlgn="auto" latinLnBrk="0" hangingPunct="1">
+                        <a:lnSpc>
+                          <a:spcPct val="100000"/>
+                        </a:lnSpc>
+                        <a:spcBef>
+                          <a:spcPts val="0"/>
+                        </a:spcBef>
+                        <a:spcAft>
+                          <a:spcPts val="0"/>
+                        </a:spcAft>
+                        <a:buClrTx/>
+                        <a:buSzTx/>
+                        <a:buFontTx/>
+                        <a:buNone/>
+                        <a:tabLst/>
+                        <a:defRPr/>
+                      </a:pPr>
+                      <a:r>
+                        <a:rPr lang="en-US" altLang="zh-CN" sz="1200" dirty="0"/>
+                        <a:t>total energy consumption(centralize)</a:t>
+                      </a:r>
+                    </a:p>
+                  </a:txBody>
+                  <a:tcPr/>
+                </a:tc>
+                <a:extLst>
+                  <a:ext uri="{0D108BD9-81ED-4DB2-BD59-A6C34878D82A}">
+                    <a16:rowId xmlns:a16="http://schemas.microsoft.com/office/drawing/2014/main" val="2897599878"/>
+                  </a:ext>
+                </a:extLst>
+              </a:tr>
+              <a:tr h="372007">
+                <a:tc>
+                  <a:txBody>
+                    <a:bodyPr/>
+                    <a:lstStyle/>
+                    <a:p>
+                      <a:r>
+                        <a:rPr lang="en-US" altLang="zh-CN" sz="1800" b="0" i="0" kern="1200" dirty="0">
+                          <a:solidFill>
+                            <a:schemeClr val="dk1"/>
+                          </a:solidFill>
+                          <a:effectLst/>
+                          <a:latin typeface="+mn-lt"/>
+                          <a:ea typeface="+mn-ea"/>
+                          <a:cs typeface="+mn-cs"/>
+                        </a:rPr>
+                        <a:t>39857938J</a:t>
+                      </a:r>
+                      <a:endParaRPr lang="zh-CN" altLang="en-US" dirty="0"/>
+                    </a:p>
+                  </a:txBody>
+                  <a:tcPr/>
+                </a:tc>
+                <a:tc>
+                  <a:txBody>
+                    <a:bodyPr/>
+                    <a:lstStyle/>
+                    <a:p>
+                      <a:r>
+                        <a:rPr lang="en-US" altLang="zh-CN" sz="1800" b="0" i="0" kern="1200" dirty="0">
+                          <a:solidFill>
+                            <a:schemeClr val="dk1"/>
+                          </a:solidFill>
+                          <a:effectLst/>
+                          <a:latin typeface="+mn-lt"/>
+                          <a:ea typeface="+mn-ea"/>
+                          <a:cs typeface="+mn-cs"/>
+                        </a:rPr>
+                        <a:t>41632904</a:t>
+                      </a:r>
+                      <a:endParaRPr lang="zh-CN" altLang="en-US" dirty="0"/>
+                    </a:p>
+                  </a:txBody>
+                  <a:tcPr/>
+                </a:tc>
+                <a:extLst>
+                  <a:ext uri="{0D108BD9-81ED-4DB2-BD59-A6C34878D82A}">
+                    <a16:rowId xmlns:a16="http://schemas.microsoft.com/office/drawing/2014/main" val="2150880168"/>
+                  </a:ext>
+                </a:extLst>
+              </a:tr>
+            </a:tbl>
+          </a:graphicData>
+        </a:graphic>
+      </p:graphicFrame>
+      <p:pic>
+        <p:nvPicPr>
+          <p:cNvPr id="20" name="图片 19">
+            <a:extLst>
+              <a:ext uri="{FF2B5EF4-FFF2-40B4-BE49-F238E27FC236}">
+                <a16:creationId xmlns:a16="http://schemas.microsoft.com/office/drawing/2014/main" id="{5BDEA0D2-F9AD-7D97-75F8-6996D6E12090}"/>
+              </a:ext>
+            </a:extLst>
+          </p:cNvPr>
+          <p:cNvPicPr>
+            <a:picLocks noChangeAspect="1"/>
+          </p:cNvPicPr>
+          <p:nvPr/>
+        </p:nvPicPr>
+        <p:blipFill>
+          <a:blip r:embed="rId7"/>
+          <a:stretch>
+            <a:fillRect/>
+          </a:stretch>
+        </p:blipFill>
+        <p:spPr>
+          <a:xfrm>
+            <a:off x="669924" y="5033926"/>
+            <a:ext cx="3305503" cy="1732006"/>
+          </a:xfrm>
+          <a:prstGeom prst="rect">
+            <a:avLst/>
+          </a:prstGeom>
+        </p:spPr>
+      </p:pic>
+      <p:sp>
+        <p:nvSpPr>
+          <p:cNvPr id="22" name="文本框 21">
+            <a:extLst>
+              <a:ext uri="{FF2B5EF4-FFF2-40B4-BE49-F238E27FC236}">
+                <a16:creationId xmlns:a16="http://schemas.microsoft.com/office/drawing/2014/main" id="{F09E4FCB-F1F8-D9BC-4AF5-1FCB1F47E91E}"/>
+              </a:ext>
+            </a:extLst>
+          </p:cNvPr>
+          <p:cNvSpPr txBox="1"/>
+          <p:nvPr/>
+        </p:nvSpPr>
+        <p:spPr>
+          <a:xfrm>
+            <a:off x="667418" y="4584471"/>
+            <a:ext cx="3110147" cy="307777"/>
+          </a:xfrm>
+          <a:prstGeom prst="rect">
+            <a:avLst/>
+          </a:prstGeom>
+          <a:noFill/>
+        </p:spPr>
+        <p:txBody>
+          <a:bodyPr wrap="none" rtlCol="0">
+            <a:spAutoFit/>
+          </a:bodyPr>
+          <a:lstStyle/>
+          <a:p>
+            <a:r>
+              <a:rPr kumimoji="1" lang="en-US" altLang="zh-CN" sz="1400" dirty="0"/>
+              <a:t>2. Simulated 10 epochs on 1 devices</a:t>
+            </a:r>
+            <a:endParaRPr kumimoji="1" lang="zh-CN" altLang="en-US" sz="1400" dirty="0"/>
+          </a:p>
+        </p:txBody>
+      </p:sp>
+      <p:pic>
+        <p:nvPicPr>
+          <p:cNvPr id="23" name="图片 22">
+            <a:extLst>
+              <a:ext uri="{FF2B5EF4-FFF2-40B4-BE49-F238E27FC236}">
+                <a16:creationId xmlns:a16="http://schemas.microsoft.com/office/drawing/2014/main" id="{B7ADEC4A-461E-1385-F3E8-DBD33CBAEC43}"/>
+              </a:ext>
+            </a:extLst>
+          </p:cNvPr>
+          <p:cNvPicPr>
+            <a:picLocks noChangeAspect="1"/>
+          </p:cNvPicPr>
+          <p:nvPr/>
+        </p:nvPicPr>
+        <p:blipFill>
+          <a:blip r:embed="rId8"/>
+          <a:stretch>
+            <a:fillRect/>
+          </a:stretch>
+        </p:blipFill>
+        <p:spPr>
+          <a:xfrm>
+            <a:off x="4195681" y="5019086"/>
+            <a:ext cx="3411824" cy="1760941"/>
+          </a:xfrm>
+          <a:prstGeom prst="rect">
+            <a:avLst/>
+          </a:prstGeom>
+        </p:spPr>
+      </p:pic>
+    </p:spTree>
+    <p:extLst>
+      <p:ext uri="{BB962C8B-B14F-4D97-AF65-F5344CB8AC3E}">
+        <p14:creationId xmlns:p14="http://schemas.microsoft.com/office/powerpoint/2010/main" val="1203632395"/>
+      </p:ext>
+    </p:extLst>
+  </p:cSld>
+  <p:clrMapOvr>
+    <a:masterClrMapping/>
+  </p:clrMapOvr>
+  <p:transition>
+    <p:checker/>
+  </p:transition>
+</p:sld>
+</file>
+
+<file path=ppt/slides/slide6.xml><?xml version="1.0" encoding="utf-8"?>
+<p:sld xmlns:a="http://schemas.openxmlformats.org/drawingml/2006/main" xmlns:r="http://schemas.openxmlformats.org/officeDocument/2006/relationships" xmlns:p="http://schemas.openxmlformats.org/presentationml/2006/main">
+  <p:cSld>
+    <p:spTree>
+      <p:nvGrpSpPr>
+        <p:cNvPr id="1" name=""/>
+        <p:cNvGrpSpPr/>
+        <p:nvPr/>
+      </p:nvGrpSpPr>
+      <p:grpSpPr>
+        <a:xfrm>
+          <a:off x="0" y="0"/>
+          <a:ext cx="0" cy="0"/>
+          <a:chOff x="0" y="0"/>
+          <a:chExt cx="0" cy="0"/>
+        </a:xfrm>
+      </p:grpSpPr>
+      <p:sp>
+        <p:nvSpPr>
+          <p:cNvPr id="2" name="标题 1"/>
+          <p:cNvSpPr>
+            <a:spLocks noGrp="1"/>
+          </p:cNvSpPr>
+          <p:nvPr>
+            <p:ph type="title"/>
+          </p:nvPr>
+        </p:nvSpPr>
+        <p:spPr>
+          <a:xfrm>
+            <a:off x="669924" y="-8794"/>
+            <a:ext cx="10850563" cy="1028699"/>
+          </a:xfrm>
+        </p:spPr>
+        <p:txBody>
+          <a:bodyPr/>
+          <a:lstStyle/>
+          <a:p>
+            <a:r>
+              <a:rPr lang="en-US" altLang="zh-CN" sz="2800" b="1" dirty="0">
+                <a:solidFill>
+                  <a:schemeClr val="tx1"/>
+                </a:solidFill>
+              </a:rPr>
+              <a:t>Questions</a:t>
+            </a:r>
+            <a:endParaRPr lang="en-US" altLang="zh-CN" dirty="0"/>
+          </a:p>
+        </p:txBody>
+      </p:sp>
       <p:pic>
         <p:nvPicPr>
           <p:cNvPr id="3" name="Google Shape;64;p1" descr="徽标&#10;&#10;描述已自动生成">
@@ -18861,7 +19233,7 @@
           <p:nvPr/>
         </p:nvPicPr>
         <p:blipFill rotWithShape="1">
-          <a:blip r:embed="rId5">
+          <a:blip r:embed="rId3">
             <a:alphaModFix/>
           </a:blip>
           <a:srcRect/>
@@ -18886,7 +19258,7 @@
           <p:cNvPr id="4" name="文本框 3">
             <a:extLst>
               <a:ext uri="{FF2B5EF4-FFF2-40B4-BE49-F238E27FC236}">
-                <a16:creationId xmlns:a16="http://schemas.microsoft.com/office/drawing/2014/main" id="{33CD7914-DA8C-F7EC-F67D-63D750C8B09F}"/>
+                <a16:creationId xmlns:a16="http://schemas.microsoft.com/office/drawing/2014/main" id="{5C5D0E58-9870-C834-C47C-BB59EC5AB736}"/>
               </a:ext>
             </a:extLst>
           </p:cNvPr>
@@ -18895,8 +19267,8 @@
         </p:nvSpPr>
         <p:spPr>
           <a:xfrm>
-            <a:off x="668182" y="6301368"/>
-            <a:ext cx="9195146" cy="307777"/>
+            <a:off x="669924" y="1277007"/>
+            <a:ext cx="6231193" cy="307777"/>
           </a:xfrm>
           <a:prstGeom prst="rect">
             <a:avLst/>
@@ -18911,23 +19283,178 @@
           <a:p>
             <a:r>
               <a:rPr kumimoji="1" lang="en-US" altLang="zh-CN" sz="1400" dirty="0"/>
-              <a:t>For GPU energy consumption, concerning the current device that using, </a:t>
-            </a:r>
-            <a:r>
-              <a:rPr kumimoji="1" lang="en-US" altLang="zh-CN" sz="1400" dirty="0" err="1"/>
-              <a:t>codecarbon</a:t>
-            </a:r>
-            <a:r>
-              <a:rPr kumimoji="1" lang="en-US" altLang="zh-CN" sz="1400" dirty="0"/>
-              <a:t> might not be the best choice</a:t>
+              <a:t>Update the parameters in the final model, using averaging causing problems</a:t>
             </a:r>
           </a:p>
         </p:txBody>
       </p:sp>
+      <p:graphicFrame>
+        <p:nvGraphicFramePr>
+          <p:cNvPr id="6" name="表格 5">
+            <a:extLst>
+              <a:ext uri="{FF2B5EF4-FFF2-40B4-BE49-F238E27FC236}">
+                <a16:creationId xmlns:a16="http://schemas.microsoft.com/office/drawing/2014/main" id="{B6C45A9E-C036-50C8-850F-D6AD475AEBDF}"/>
+              </a:ext>
+            </a:extLst>
+          </p:cNvPr>
+          <p:cNvGraphicFramePr>
+            <a:graphicFrameLocks noGrp="1"/>
+          </p:cNvGraphicFramePr>
+          <p:nvPr>
+            <p:extLst>
+              <p:ext uri="{D42A27DB-BD31-4B8C-83A1-F6EECF244321}">
+                <p14:modId xmlns:p14="http://schemas.microsoft.com/office/powerpoint/2010/main" val="1091267047"/>
+              </p:ext>
+            </p:extLst>
+          </p:nvPr>
+        </p:nvGraphicFramePr>
+        <p:xfrm>
+          <a:off x="669924" y="1801666"/>
+          <a:ext cx="5418666" cy="1112520"/>
+        </p:xfrm>
+        <a:graphic>
+          <a:graphicData uri="http://schemas.openxmlformats.org/drawingml/2006/table">
+            <a:tbl>
+              <a:tblPr firstRow="1" bandRow="1">
+                <a:tableStyleId>{5C22544A-7EE6-4342-B048-85BDC9FD1C3A}</a:tableStyleId>
+              </a:tblPr>
+              <a:tblGrid>
+                <a:gridCol w="2709333">
+                  <a:extLst>
+                    <a:ext uri="{9D8B030D-6E8A-4147-A177-3AD203B41FA5}">
+                      <a16:colId xmlns:a16="http://schemas.microsoft.com/office/drawing/2014/main" val="2603955590"/>
+                    </a:ext>
+                  </a:extLst>
+                </a:gridCol>
+                <a:gridCol w="2709333">
+                  <a:extLst>
+                    <a:ext uri="{9D8B030D-6E8A-4147-A177-3AD203B41FA5}">
+                      <a16:colId xmlns:a16="http://schemas.microsoft.com/office/drawing/2014/main" val="1355961405"/>
+                    </a:ext>
+                  </a:extLst>
+                </a:gridCol>
+              </a:tblGrid>
+              <a:tr h="370840">
+                <a:tc>
+                  <a:txBody>
+                    <a:bodyPr/>
+                    <a:lstStyle/>
+                    <a:p>
+                      <a:r>
+                        <a:rPr lang="en-US" altLang="zh-CN" dirty="0"/>
+                        <a:t>weight</a:t>
+                      </a:r>
+                      <a:endParaRPr lang="zh-CN" altLang="en-US" dirty="0"/>
+                    </a:p>
+                  </a:txBody>
+                  <a:tcPr/>
+                </a:tc>
+                <a:tc>
+                  <a:txBody>
+                    <a:bodyPr/>
+                    <a:lstStyle/>
+                    <a:p>
+                      <a:r>
+                        <a:rPr lang="en-US" altLang="zh-CN" dirty="0"/>
+                        <a:t>test acc</a:t>
+                      </a:r>
+                      <a:endParaRPr lang="zh-CN" altLang="en-US" dirty="0"/>
+                    </a:p>
+                  </a:txBody>
+                  <a:tcPr/>
+                </a:tc>
+                <a:extLst>
+                  <a:ext uri="{0D108BD9-81ED-4DB2-BD59-A6C34878D82A}">
+                    <a16:rowId xmlns:a16="http://schemas.microsoft.com/office/drawing/2014/main" val="456238060"/>
+                  </a:ext>
+                </a:extLst>
+              </a:tr>
+              <a:tr h="370840">
+                <a:tc>
+                  <a:txBody>
+                    <a:bodyPr/>
+                    <a:lstStyle/>
+                    <a:p>
+                      <a:r>
+                        <a:rPr lang="en-US" altLang="zh-CN" dirty="0"/>
+                        <a:t>0.8,0.2</a:t>
+                      </a:r>
+                      <a:endParaRPr lang="zh-CN" altLang="en-US" dirty="0"/>
+                    </a:p>
+                  </a:txBody>
+                  <a:tcPr/>
+                </a:tc>
+                <a:tc>
+                  <a:txBody>
+                    <a:bodyPr/>
+                    <a:lstStyle/>
+                    <a:p>
+                      <a:r>
+                        <a:rPr lang="en-US" altLang="zh-CN" sz="1800" b="0" i="0" kern="1200" dirty="0">
+                          <a:solidFill>
+                            <a:schemeClr val="dk1"/>
+                          </a:solidFill>
+                          <a:effectLst/>
+                          <a:latin typeface="+mn-lt"/>
+                          <a:ea typeface="+mn-ea"/>
+                          <a:cs typeface="+mn-cs"/>
+                        </a:rPr>
+                        <a:t>0.8321</a:t>
+                      </a:r>
+                      <a:endParaRPr lang="zh-CN" altLang="en-US" dirty="0"/>
+                    </a:p>
+                  </a:txBody>
+                  <a:tcPr/>
+                </a:tc>
+                <a:extLst>
+                  <a:ext uri="{0D108BD9-81ED-4DB2-BD59-A6C34878D82A}">
+                    <a16:rowId xmlns:a16="http://schemas.microsoft.com/office/drawing/2014/main" val="1026298052"/>
+                  </a:ext>
+                </a:extLst>
+              </a:tr>
+              <a:tr h="370840">
+                <a:tc>
+                  <a:txBody>
+                    <a:bodyPr/>
+                    <a:lstStyle/>
+                    <a:p>
+                      <a:r>
+                        <a:rPr lang="en-US" altLang="zh-CN" dirty="0"/>
+                        <a:t>0.5,0.5</a:t>
+                      </a:r>
+                      <a:endParaRPr lang="zh-CN" altLang="en-US" dirty="0"/>
+                    </a:p>
+                  </a:txBody>
+                  <a:tcPr/>
+                </a:tc>
+                <a:tc>
+                  <a:txBody>
+                    <a:bodyPr/>
+                    <a:lstStyle/>
+                    <a:p>
+                      <a:r>
+                        <a:rPr lang="en-US" altLang="zh-CN" dirty="0"/>
+                        <a:t>0.2759</a:t>
+                      </a:r>
+                      <a:endParaRPr lang="zh-CN" altLang="en-US" dirty="0"/>
+                    </a:p>
+                  </a:txBody>
+                  <a:tcPr/>
+                </a:tc>
+                <a:extLst>
+                  <a:ext uri="{0D108BD9-81ED-4DB2-BD59-A6C34878D82A}">
+                    <a16:rowId xmlns:a16="http://schemas.microsoft.com/office/drawing/2014/main" val="612173137"/>
+                  </a:ext>
+                </a:extLst>
+              </a:tr>
+            </a:tbl>
+          </a:graphicData>
+        </a:graphic>
+      </p:graphicFrame>
     </p:spTree>
     <p:extLst>
       <p:ext uri="{BB962C8B-B14F-4D97-AF65-F5344CB8AC3E}">
-        <p14:creationId xmlns:p14="http://schemas.microsoft.com/office/powerpoint/2010/main" val="1203632395"/>
+        <p14:creationId xmlns:p14="http://schemas.microsoft.com/office/powerpoint/2010/main" val="2734356969"/>
       </p:ext>
     </p:extLst>
   </p:cSld>
@@ -18940,7 +19467,7 @@
 </p:sld>
 </file>
 
-<file path=ppt/slides/slide6.xml><?xml version="1.0" encoding="utf-8"?>
+<file path=ppt/slides/slide7.xml><?xml version="1.0" encoding="utf-8"?>
 <p:sld xmlns:a="http://schemas.openxmlformats.org/drawingml/2006/main" xmlns:r="http://schemas.openxmlformats.org/officeDocument/2006/relationships" xmlns:p="http://schemas.openxmlformats.org/presentationml/2006/main">
   <p:cSld>
     <p:spTree>

</xml_diff>

<commit_message>
udpate the data analysis
</commit_message>
<xml_diff>
--- a/presentation/4th_presentation/GreenAI_4th.pptx
+++ b/presentation/4th_presentation/GreenAI_4th.pptx
@@ -4868,22 +4868,6 @@
     </pc:docChg>
   </pc:docChgLst>
   <pc:docChgLst>
-    <pc:chgData name="HUANG LIN" userId="S::s301266@studenti.polito.it::1b5dcee7-0d99-405d-a0f0-637f14b99ad0" providerId="AD" clId="Web-{320DFB42-AB3A-43D0-A938-93D726B4159B}"/>
-    <pc:docChg chg="delSld">
-      <pc:chgData name="HUANG LIN" userId="S::s301266@studenti.polito.it::1b5dcee7-0d99-405d-a0f0-637f14b99ad0" providerId="AD" clId="Web-{320DFB42-AB3A-43D0-A938-93D726B4159B}" dt="2023-05-09T16:32:15.048" v="0"/>
-      <pc:docMkLst>
-        <pc:docMk/>
-      </pc:docMkLst>
-      <pc:sldChg chg="del">
-        <pc:chgData name="HUANG LIN" userId="S::s301266@studenti.polito.it::1b5dcee7-0d99-405d-a0f0-637f14b99ad0" providerId="AD" clId="Web-{320DFB42-AB3A-43D0-A938-93D726B4159B}" dt="2023-05-09T16:32:15.048" v="0"/>
-        <pc:sldMkLst>
-          <pc:docMk/>
-          <pc:sldMk cId="3625760117" sldId="359"/>
-        </pc:sldMkLst>
-      </pc:sldChg>
-    </pc:docChg>
-  </pc:docChgLst>
-  <pc:docChgLst>
     <pc:chgData name="Li  Yangshihao" userId="S::s302568@studenti.polito.it::ee48da2e-17a2-4953-b1e7-564eeca1e514" providerId="AD" clId="Web-{29B38739-F18C-4A97-8E48-F53C74F0D6C9}"/>
     <pc:docChg chg="addSld delSld modSld">
       <pc:chgData name="Li  Yangshihao" userId="S::s302568@studenti.polito.it::ee48da2e-17a2-4953-b1e7-564eeca1e514" providerId="AD" clId="Web-{29B38739-F18C-4A97-8E48-F53C74F0D6C9}" dt="2023-05-09T20:45:32.365" v="126"/>
@@ -4927,6 +4911,22 @@
             <ac:graphicFrameMk id="6" creationId="{3DEF3590-4F19-D115-5DC6-7ABE16C2CF37}"/>
           </ac:graphicFrameMkLst>
         </pc:graphicFrameChg>
+      </pc:sldChg>
+    </pc:docChg>
+  </pc:docChgLst>
+  <pc:docChgLst>
+    <pc:chgData name="HUANG LIN" userId="S::s301266@studenti.polito.it::1b5dcee7-0d99-405d-a0f0-637f14b99ad0" providerId="AD" clId="Web-{320DFB42-AB3A-43D0-A938-93D726B4159B}"/>
+    <pc:docChg chg="delSld">
+      <pc:chgData name="HUANG LIN" userId="S::s301266@studenti.polito.it::1b5dcee7-0d99-405d-a0f0-637f14b99ad0" providerId="AD" clId="Web-{320DFB42-AB3A-43D0-A938-93D726B4159B}" dt="2023-05-09T16:32:15.048" v="0"/>
+      <pc:docMkLst>
+        <pc:docMk/>
+      </pc:docMkLst>
+      <pc:sldChg chg="del">
+        <pc:chgData name="HUANG LIN" userId="S::s301266@studenti.polito.it::1b5dcee7-0d99-405d-a0f0-637f14b99ad0" providerId="AD" clId="Web-{320DFB42-AB3A-43D0-A938-93D726B4159B}" dt="2023-05-09T16:32:15.048" v="0"/>
+        <pc:sldMkLst>
+          <pc:docMk/>
+          <pc:sldMk cId="3625760117" sldId="359"/>
+        </pc:sldMkLst>
       </pc:sldChg>
     </pc:docChg>
   </pc:docChgLst>
@@ -10472,7 +10472,7 @@
           <a:p>
             <a:fld id="{0F9B84EA-7D68-4D60-9CB1-D50884785D1C}" type="datetimeFigureOut">
               <a:rPr lang="zh-CN" altLang="en-US" smtClean="0"/>
-              <a:t>2023/12/22</a:t>
+              <a:t>2024/6/25</a:t>
             </a:fld>
             <a:endParaRPr lang="zh-CN" altLang="en-US"/>
           </a:p>
@@ -10637,7 +10637,7 @@
           <a:p>
             <a:fld id="{E86D8963-CFCD-4740-AF60-049850373CDF}" type="datetimeFigureOut">
               <a:rPr lang="zh-CN" altLang="en-US" smtClean="0"/>
-              <a:t>2023/12/22</a:t>
+              <a:t>2024/6/25</a:t>
             </a:fld>
             <a:endParaRPr lang="zh-CN" altLang="en-US"/>
           </a:p>
@@ -11895,7 +11895,7 @@
           <a:p>
             <a:fld id="{44997768-0F3B-4C42-8732-89CAF429E39F}" type="datetime1">
               <a:rPr lang="zh-CN" altLang="en-US" smtClean="0"/>
-              <a:t>2023/12/22</a:t>
+              <a:t>2024/6/25</a:t>
             </a:fld>
             <a:endParaRPr lang="zh-CN" altLang="en-US"/>
           </a:p>
@@ -12136,7 +12136,7 @@
           <a:p>
             <a:fld id="{B2D0698E-25F7-2942-821D-B02E8F91024F}" type="datetime1">
               <a:rPr lang="zh-CN" altLang="en-US" smtClean="0"/>
-              <a:t>2023/12/22</a:t>
+              <a:t>2024/6/25</a:t>
             </a:fld>
             <a:endParaRPr lang="zh-CN" altLang="en-US"/>
           </a:p>
@@ -13483,7 +13483,7 @@
           <a:p>
             <a:fld id="{6489D9C7-5DC6-4263-87FF-7C99F6FB63C3}" type="datetime1">
               <a:rPr lang="zh-CN" altLang="en-US" smtClean="0"/>
-              <a:t>2023/12/22</a:t>
+              <a:t>2024/6/25</a:t>
             </a:fld>
             <a:endParaRPr lang="zh-CN" altLang="en-US"/>
           </a:p>
@@ -13724,7 +13724,7 @@
           <a:p>
             <a:fld id="{6489D9C7-5DC6-4263-87FF-7C99F6FB63C3}" type="datetime1">
               <a:rPr lang="zh-CN" altLang="en-US" smtClean="0"/>
-              <a:t>2023/12/22</a:t>
+              <a:t>2024/6/25</a:t>
             </a:fld>
             <a:endParaRPr lang="zh-CN" altLang="en-US"/>
           </a:p>
@@ -14630,7 +14630,7 @@
           <a:p>
             <a:fld id="{44997768-0F3B-4C42-8732-89CAF429E39F}" type="datetime1">
               <a:rPr lang="zh-CN" altLang="en-US" smtClean="0"/>
-              <a:t>2023/12/22</a:t>
+              <a:t>2024/6/25</a:t>
             </a:fld>
             <a:endParaRPr lang="zh-CN" altLang="en-US"/>
           </a:p>
@@ -14870,7 +14870,7 @@
           <a:p>
             <a:fld id="{B2D0698E-25F7-2942-821D-B02E8F91024F}" type="datetime1">
               <a:rPr lang="zh-CN" altLang="en-US" smtClean="0"/>
-              <a:t>2023/12/22</a:t>
+              <a:t>2024/6/25</a:t>
             </a:fld>
             <a:endParaRPr lang="zh-CN" altLang="en-US"/>
           </a:p>
@@ -16373,7 +16373,7 @@
           <a:p>
             <a:fld id="{F6DE2F0B-553A-0F46-B53A-381754DB6C4C}" type="datetime1">
               <a:rPr lang="zh-CN" altLang="en-US" smtClean="0"/>
-              <a:t>2023/12/22</a:t>
+              <a:t>2024/6/25</a:t>
             </a:fld>
             <a:endParaRPr lang="zh-CN" altLang="en-US"/>
           </a:p>
@@ -16960,7 +16960,7 @@
           <a:p>
             <a:fld id="{6489D9C7-5DC6-4263-87FF-7C99F6FB63C3}" type="datetime1">
               <a:rPr lang="zh-CN" altLang="en-US" smtClean="0"/>
-              <a:t>2023/12/22</a:t>
+              <a:t>2024/6/25</a:t>
             </a:fld>
             <a:endParaRPr lang="zh-CN" altLang="en-US"/>
           </a:p>
@@ -18325,7 +18325,7 @@
         </p:nvSpPr>
         <p:spPr>
           <a:xfrm>
-            <a:off x="6817179" y="1502228"/>
+            <a:off x="7874615" y="1228850"/>
             <a:ext cx="2583849" cy="307777"/>
           </a:xfrm>
           <a:prstGeom prst="rect">
@@ -18369,7 +18369,7 @@
         </p:blipFill>
         <p:spPr>
           <a:xfrm>
-            <a:off x="5070765" y="4221854"/>
+            <a:off x="6128201" y="3948476"/>
             <a:ext cx="5131302" cy="2820716"/>
           </a:xfrm>
           <a:prstGeom prst="rect">
@@ -18391,7 +18391,7 @@
         </p:nvSpPr>
         <p:spPr>
           <a:xfrm>
-            <a:off x="7988673" y="5959441"/>
+            <a:off x="9046109" y="5686063"/>
             <a:ext cx="1398140" cy="246221"/>
           </a:xfrm>
           <a:prstGeom prst="rect">
@@ -18435,7 +18435,7 @@
         </p:blipFill>
         <p:spPr>
           <a:xfrm>
-            <a:off x="5909723" y="1898293"/>
+            <a:off x="6967159" y="1624915"/>
             <a:ext cx="4182410" cy="2323561"/>
           </a:xfrm>
           <a:prstGeom prst="rect">
@@ -18457,7 +18457,7 @@
         </p:nvSpPr>
         <p:spPr>
           <a:xfrm>
-            <a:off x="7988673" y="3569914"/>
+            <a:off x="9046109" y="3296536"/>
             <a:ext cx="1327608" cy="246221"/>
           </a:xfrm>
           <a:prstGeom prst="rect">

</xml_diff>

<commit_message>
update the  data and slides
</commit_message>
<xml_diff>
--- a/presentation/4th_presentation/GreenAI_4th.pptx
+++ b/presentation/4th_presentation/GreenAI_4th.pptx
@@ -4868,6 +4868,22 @@
     </pc:docChg>
   </pc:docChgLst>
   <pc:docChgLst>
+    <pc:chgData name="HUANG LIN" userId="S::s301266@studenti.polito.it::1b5dcee7-0d99-405d-a0f0-637f14b99ad0" providerId="AD" clId="Web-{320DFB42-AB3A-43D0-A938-93D726B4159B}"/>
+    <pc:docChg chg="delSld">
+      <pc:chgData name="HUANG LIN" userId="S::s301266@studenti.polito.it::1b5dcee7-0d99-405d-a0f0-637f14b99ad0" providerId="AD" clId="Web-{320DFB42-AB3A-43D0-A938-93D726B4159B}" dt="2023-05-09T16:32:15.048" v="0"/>
+      <pc:docMkLst>
+        <pc:docMk/>
+      </pc:docMkLst>
+      <pc:sldChg chg="del">
+        <pc:chgData name="HUANG LIN" userId="S::s301266@studenti.polito.it::1b5dcee7-0d99-405d-a0f0-637f14b99ad0" providerId="AD" clId="Web-{320DFB42-AB3A-43D0-A938-93D726B4159B}" dt="2023-05-09T16:32:15.048" v="0"/>
+        <pc:sldMkLst>
+          <pc:docMk/>
+          <pc:sldMk cId="3625760117" sldId="359"/>
+        </pc:sldMkLst>
+      </pc:sldChg>
+    </pc:docChg>
+  </pc:docChgLst>
+  <pc:docChgLst>
     <pc:chgData name="Li  Yangshihao" userId="S::s302568@studenti.polito.it::ee48da2e-17a2-4953-b1e7-564eeca1e514" providerId="AD" clId="Web-{29B38739-F18C-4A97-8E48-F53C74F0D6C9}"/>
     <pc:docChg chg="addSld delSld modSld">
       <pc:chgData name="Li  Yangshihao" userId="S::s302568@studenti.polito.it::ee48da2e-17a2-4953-b1e7-564eeca1e514" providerId="AD" clId="Web-{29B38739-F18C-4A97-8E48-F53C74F0D6C9}" dt="2023-05-09T20:45:32.365" v="126"/>
@@ -4911,22 +4927,6 @@
             <ac:graphicFrameMk id="6" creationId="{3DEF3590-4F19-D115-5DC6-7ABE16C2CF37}"/>
           </ac:graphicFrameMkLst>
         </pc:graphicFrameChg>
-      </pc:sldChg>
-    </pc:docChg>
-  </pc:docChgLst>
-  <pc:docChgLst>
-    <pc:chgData name="HUANG LIN" userId="S::s301266@studenti.polito.it::1b5dcee7-0d99-405d-a0f0-637f14b99ad0" providerId="AD" clId="Web-{320DFB42-AB3A-43D0-A938-93D726B4159B}"/>
-    <pc:docChg chg="delSld">
-      <pc:chgData name="HUANG LIN" userId="S::s301266@studenti.polito.it::1b5dcee7-0d99-405d-a0f0-637f14b99ad0" providerId="AD" clId="Web-{320DFB42-AB3A-43D0-A938-93D726B4159B}" dt="2023-05-09T16:32:15.048" v="0"/>
-      <pc:docMkLst>
-        <pc:docMk/>
-      </pc:docMkLst>
-      <pc:sldChg chg="del">
-        <pc:chgData name="HUANG LIN" userId="S::s301266@studenti.polito.it::1b5dcee7-0d99-405d-a0f0-637f14b99ad0" providerId="AD" clId="Web-{320DFB42-AB3A-43D0-A938-93D726B4159B}" dt="2023-05-09T16:32:15.048" v="0"/>
-        <pc:sldMkLst>
-          <pc:docMk/>
-          <pc:sldMk cId="3625760117" sldId="359"/>
-        </pc:sldMkLst>
       </pc:sldChg>
     </pc:docChg>
   </pc:docChgLst>
@@ -10472,7 +10472,7 @@
           <a:p>
             <a:fld id="{0F9B84EA-7D68-4D60-9CB1-D50884785D1C}" type="datetimeFigureOut">
               <a:rPr lang="zh-CN" altLang="en-US" smtClean="0"/>
-              <a:t>2024/6/25</a:t>
+              <a:t>2024/7/17</a:t>
             </a:fld>
             <a:endParaRPr lang="zh-CN" altLang="en-US"/>
           </a:p>
@@ -10637,7 +10637,7 @@
           <a:p>
             <a:fld id="{E86D8963-CFCD-4740-AF60-049850373CDF}" type="datetimeFigureOut">
               <a:rPr lang="zh-CN" altLang="en-US" smtClean="0"/>
-              <a:t>2024/6/25</a:t>
+              <a:t>2024/7/17</a:t>
             </a:fld>
             <a:endParaRPr lang="zh-CN" altLang="en-US"/>
           </a:p>
@@ -11895,7 +11895,7 @@
           <a:p>
             <a:fld id="{44997768-0F3B-4C42-8732-89CAF429E39F}" type="datetime1">
               <a:rPr lang="zh-CN" altLang="en-US" smtClean="0"/>
-              <a:t>2024/6/25</a:t>
+              <a:t>2024/7/17</a:t>
             </a:fld>
             <a:endParaRPr lang="zh-CN" altLang="en-US"/>
           </a:p>
@@ -12136,7 +12136,7 @@
           <a:p>
             <a:fld id="{B2D0698E-25F7-2942-821D-B02E8F91024F}" type="datetime1">
               <a:rPr lang="zh-CN" altLang="en-US" smtClean="0"/>
-              <a:t>2024/6/25</a:t>
+              <a:t>2024/7/17</a:t>
             </a:fld>
             <a:endParaRPr lang="zh-CN" altLang="en-US"/>
           </a:p>
@@ -13483,7 +13483,7 @@
           <a:p>
             <a:fld id="{6489D9C7-5DC6-4263-87FF-7C99F6FB63C3}" type="datetime1">
               <a:rPr lang="zh-CN" altLang="en-US" smtClean="0"/>
-              <a:t>2024/6/25</a:t>
+              <a:t>2024/7/17</a:t>
             </a:fld>
             <a:endParaRPr lang="zh-CN" altLang="en-US"/>
           </a:p>
@@ -13724,7 +13724,7 @@
           <a:p>
             <a:fld id="{6489D9C7-5DC6-4263-87FF-7C99F6FB63C3}" type="datetime1">
               <a:rPr lang="zh-CN" altLang="en-US" smtClean="0"/>
-              <a:t>2024/6/25</a:t>
+              <a:t>2024/7/17</a:t>
             </a:fld>
             <a:endParaRPr lang="zh-CN" altLang="en-US"/>
           </a:p>
@@ -14630,7 +14630,7 @@
           <a:p>
             <a:fld id="{44997768-0F3B-4C42-8732-89CAF429E39F}" type="datetime1">
               <a:rPr lang="zh-CN" altLang="en-US" smtClean="0"/>
-              <a:t>2024/6/25</a:t>
+              <a:t>2024/7/17</a:t>
             </a:fld>
             <a:endParaRPr lang="zh-CN" altLang="en-US"/>
           </a:p>
@@ -14870,7 +14870,7 @@
           <a:p>
             <a:fld id="{B2D0698E-25F7-2942-821D-B02E8F91024F}" type="datetime1">
               <a:rPr lang="zh-CN" altLang="en-US" smtClean="0"/>
-              <a:t>2024/6/25</a:t>
+              <a:t>2024/7/17</a:t>
             </a:fld>
             <a:endParaRPr lang="zh-CN" altLang="en-US"/>
           </a:p>
@@ -16373,7 +16373,7 @@
           <a:p>
             <a:fld id="{F6DE2F0B-553A-0F46-B53A-381754DB6C4C}" type="datetime1">
               <a:rPr lang="zh-CN" altLang="en-US" smtClean="0"/>
-              <a:t>2024/6/25</a:t>
+              <a:t>2024/7/17</a:t>
             </a:fld>
             <a:endParaRPr lang="zh-CN" altLang="en-US"/>
           </a:p>
@@ -16960,7 +16960,7 @@
           <a:p>
             <a:fld id="{6489D9C7-5DC6-4263-87FF-7C99F6FB63C3}" type="datetime1">
               <a:rPr lang="zh-CN" altLang="en-US" smtClean="0"/>
-              <a:t>2024/6/25</a:t>
+              <a:t>2024/7/17</a:t>
             </a:fld>
             <a:endParaRPr lang="zh-CN" altLang="en-US"/>
           </a:p>
@@ -18303,7 +18303,7 @@
         </p:blipFill>
         <p:spPr>
           <a:xfrm>
-            <a:off x="1502228" y="4221854"/>
+            <a:off x="4469823" y="3036606"/>
             <a:ext cx="2577230" cy="631310"/>
           </a:xfrm>
           <a:prstGeom prst="rect">

</xml_diff>